<commit_message>
Fix ppt open error.
</commit_message>
<xml_diff>
--- a/EDU GRAPH-API Demo Script.pptx
+++ b/EDU GRAPH-API Demo Script.pptx
@@ -376,7 +376,7 @@
               <a:rPr lang="en-US" smtClean="0">
                 <a:latin typeface="Segoe UI" pitchFamily="34" charset="0"/>
               </a:rPr>
-              <a:t>11/23/2017 10:02 AM</a:t>
+              <a:t>11/24/2017 12:35 PM</a:t>
             </a:fld>
             <a:endParaRPr lang="en-US" dirty="0">
               <a:latin typeface="Segoe UI" pitchFamily="34" charset="0"/>
@@ -659,7 +659,7 @@
           <a:p>
             <a:fld id="{38EEC551-8CDA-4EB6-89BB-2A86C9F091C8}" type="datetime8">
               <a:rPr lang="en-US" smtClean="0"/>
-              <a:t>11/23/2017 10:02 AM</a:t>
+              <a:t>11/24/2017 12:35 PM</a:t>
             </a:fld>
             <a:endParaRPr lang="en-US" dirty="0"/>
           </a:p>
@@ -1023,7 +1023,7 @@
           <a:p>
             <a:fld id="{C6996B83-60CF-42A8-BA06-F99D0BEC30B3}" type="datetime1">
               <a:rPr lang="en-US" smtClean="0"/>
-              <a:t>11/23/2017</a:t>
+              <a:t>11/24/2017</a:t>
             </a:fld>
             <a:endParaRPr lang="en-US" dirty="0"/>
           </a:p>
@@ -1243,7 +1243,7 @@
                 </a:solidFill>
               </a:rPr>
               <a:pPr/>
-              <a:t>11/23/2017</a:t>
+              <a:t>11/24/2017</a:t>
             </a:fld>
             <a:endParaRPr lang="en-US" dirty="0">
               <a:solidFill>
@@ -1453,7 +1453,7 @@
                 </a:solidFill>
               </a:rPr>
               <a:pPr/>
-              <a:t>11/23/2017</a:t>
+              <a:t>11/24/2017</a:t>
             </a:fld>
             <a:endParaRPr lang="en-US" dirty="0">
               <a:solidFill>
@@ -1663,7 +1663,7 @@
                 </a:solidFill>
               </a:rPr>
               <a:pPr/>
-              <a:t>11/23/2017</a:t>
+              <a:t>11/24/2017</a:t>
             </a:fld>
             <a:endParaRPr lang="en-US" dirty="0">
               <a:solidFill>
@@ -1969,7 +1969,7 @@
                 <a:tabLst/>
                 <a:defRPr/>
               </a:pPr>
-              <a:t>11/23/2017</a:t>
+              <a:t>11/24/2017</a:t>
             </a:fld>
             <a:endParaRPr kumimoji="0" lang="en-US" sz="1800" b="0" i="0" u="none" strike="noStrike" kern="0" cap="none" spc="0" normalizeH="0" baseline="0" noProof="0" dirty="0">
               <a:ln>
@@ -2199,7 +2199,7 @@
                 </a:solidFill>
               </a:rPr>
               <a:pPr/>
-              <a:t>11/23/2017</a:t>
+              <a:t>11/24/2017</a:t>
             </a:fld>
             <a:endParaRPr lang="en-US" dirty="0">
               <a:solidFill>
@@ -2440,7 +2440,7 @@
                 </a:solidFill>
               </a:rPr>
               <a:pPr/>
-              <a:t>11/23/2017</a:t>
+              <a:t>11/24/2017</a:t>
             </a:fld>
             <a:endParaRPr lang="en-US" dirty="0">
               <a:solidFill>
@@ -2650,7 +2650,7 @@
                 </a:solidFill>
               </a:rPr>
               <a:pPr/>
-              <a:t>11/23/2017</a:t>
+              <a:t>11/24/2017</a:t>
             </a:fld>
             <a:endParaRPr lang="en-US" dirty="0">
               <a:solidFill>
@@ -2860,7 +2860,7 @@
                 </a:solidFill>
               </a:rPr>
               <a:pPr/>
-              <a:t>11/23/2017</a:t>
+              <a:t>11/24/2017</a:t>
             </a:fld>
             <a:endParaRPr lang="en-US" dirty="0">
               <a:solidFill>
@@ -3070,7 +3070,7 @@
                 </a:solidFill>
               </a:rPr>
               <a:pPr/>
-              <a:t>11/23/2017</a:t>
+              <a:t>11/24/2017</a:t>
             </a:fld>
             <a:endParaRPr lang="en-US" dirty="0">
               <a:solidFill>
@@ -3280,7 +3280,7 @@
                 </a:solidFill>
               </a:rPr>
               <a:pPr/>
-              <a:t>11/23/2017</a:t>
+              <a:t>11/24/2017</a:t>
             </a:fld>
             <a:endParaRPr lang="en-US" dirty="0">
               <a:solidFill>
@@ -3454,7 +3454,7 @@
           <a:p>
             <a:fld id="{B079C3B8-7366-4A44-A34B-3977080C19E7}" type="datetime1">
               <a:rPr lang="en-US" smtClean="0"/>
-              <a:t>11/23/2017</a:t>
+              <a:t>11/24/2017</a:t>
             </a:fld>
             <a:endParaRPr lang="en-US" dirty="0"/>
           </a:p>
@@ -3675,7 +3675,7 @@
                 </a:solidFill>
               </a:rPr>
               <a:pPr/>
-              <a:t>11/23/2017</a:t>
+              <a:t>11/24/2017</a:t>
             </a:fld>
             <a:endParaRPr lang="en-US" dirty="0">
               <a:solidFill>
@@ -3981,7 +3981,7 @@
                 <a:tabLst/>
                 <a:defRPr/>
               </a:pPr>
-              <a:t>11/23/2017</a:t>
+              <a:t>11/24/2017</a:t>
             </a:fld>
             <a:endParaRPr kumimoji="0" lang="en-US" sz="1800" b="0" i="0" u="none" strike="noStrike" kern="0" cap="none" spc="0" normalizeH="0" baseline="0" noProof="0" dirty="0">
               <a:ln>
@@ -4211,7 +4211,7 @@
                 </a:solidFill>
               </a:rPr>
               <a:pPr/>
-              <a:t>11/23/2017</a:t>
+              <a:t>11/24/2017</a:t>
             </a:fld>
             <a:endParaRPr lang="en-US" dirty="0">
               <a:solidFill>
@@ -4452,7 +4452,7 @@
                 </a:solidFill>
               </a:rPr>
               <a:pPr/>
-              <a:t>11/23/2017</a:t>
+              <a:t>11/24/2017</a:t>
             </a:fld>
             <a:endParaRPr lang="en-US" dirty="0">
               <a:solidFill>
@@ -4662,7 +4662,7 @@
                 </a:solidFill>
               </a:rPr>
               <a:pPr/>
-              <a:t>11/23/2017</a:t>
+              <a:t>11/24/2017</a:t>
             </a:fld>
             <a:endParaRPr lang="en-US" dirty="0">
               <a:solidFill>
@@ -4872,7 +4872,7 @@
                 </a:solidFill>
               </a:rPr>
               <a:pPr/>
-              <a:t>11/23/2017</a:t>
+              <a:t>11/24/2017</a:t>
             </a:fld>
             <a:endParaRPr lang="en-US" dirty="0">
               <a:solidFill>
@@ -5082,7 +5082,7 @@
                 </a:solidFill>
               </a:rPr>
               <a:pPr/>
-              <a:t>11/23/2017</a:t>
+              <a:t>11/24/2017</a:t>
             </a:fld>
             <a:endParaRPr lang="en-US" dirty="0">
               <a:solidFill>
@@ -5292,7 +5292,7 @@
                 </a:solidFill>
               </a:rPr>
               <a:pPr/>
-              <a:t>11/23/2017</a:t>
+              <a:t>11/24/2017</a:t>
             </a:fld>
             <a:endParaRPr lang="en-US" dirty="0">
               <a:solidFill>
@@ -5502,7 +5502,7 @@
                 </a:solidFill>
               </a:rPr>
               <a:pPr/>
-              <a:t>11/23/2017</a:t>
+              <a:t>11/24/2017</a:t>
             </a:fld>
             <a:endParaRPr lang="en-US" dirty="0">
               <a:solidFill>
@@ -5808,7 +5808,7 @@
                 <a:tabLst/>
                 <a:defRPr/>
               </a:pPr>
-              <a:t>11/23/2017</a:t>
+              <a:t>11/24/2017</a:t>
             </a:fld>
             <a:endParaRPr kumimoji="0" lang="en-US" sz="1800" b="0" i="0" u="none" strike="noStrike" kern="0" cap="none" spc="0" normalizeH="0" baseline="0" noProof="0" dirty="0">
               <a:ln>
@@ -6038,7 +6038,7 @@
                 </a:solidFill>
               </a:rPr>
               <a:pPr/>
-              <a:t>11/23/2017</a:t>
+              <a:t>11/24/2017</a:t>
             </a:fld>
             <a:endParaRPr lang="en-US" dirty="0">
               <a:solidFill>
@@ -6248,7 +6248,7 @@
                 </a:solidFill>
               </a:rPr>
               <a:pPr/>
-              <a:t>11/23/2017</a:t>
+              <a:t>11/24/2017</a:t>
             </a:fld>
             <a:endParaRPr lang="en-US" dirty="0">
               <a:solidFill>
@@ -6489,7 +6489,7 @@
                 </a:solidFill>
               </a:rPr>
               <a:pPr/>
-              <a:t>11/23/2017</a:t>
+              <a:t>11/24/2017</a:t>
             </a:fld>
             <a:endParaRPr lang="en-US" dirty="0">
               <a:solidFill>
@@ -6668,7 +6668,7 @@
                 </a:solidFill>
               </a:rPr>
               <a:pPr/>
-              <a:t>11/23/2017</a:t>
+              <a:t>11/24/2017</a:t>
             </a:fld>
             <a:endParaRPr lang="en-US" dirty="0">
               <a:solidFill>
@@ -6909,7 +6909,7 @@
                 </a:solidFill>
               </a:rPr>
               <a:pPr/>
-              <a:t>11/23/2017</a:t>
+              <a:t>11/24/2017</a:t>
             </a:fld>
             <a:endParaRPr lang="en-US" dirty="0">
               <a:solidFill>
@@ -7119,7 +7119,7 @@
                 </a:solidFill>
               </a:rPr>
               <a:pPr/>
-              <a:t>11/23/2017</a:t>
+              <a:t>11/24/2017</a:t>
             </a:fld>
             <a:endParaRPr lang="en-US" dirty="0">
               <a:solidFill>
@@ -7298,7 +7298,7 @@
                 </a:solidFill>
               </a:rPr>
               <a:pPr/>
-              <a:t>11/23/2017</a:t>
+              <a:t>11/24/2017</a:t>
             </a:fld>
             <a:endParaRPr lang="en-US" dirty="0">
               <a:solidFill>
@@ -7539,7 +7539,7 @@
                 </a:solidFill>
               </a:rPr>
               <a:pPr/>
-              <a:t>11/23/2017</a:t>
+              <a:t>11/24/2017</a:t>
             </a:fld>
             <a:endParaRPr lang="en-US" dirty="0">
               <a:solidFill>
@@ -7749,7 +7749,7 @@
                 </a:solidFill>
               </a:rPr>
               <a:pPr/>
-              <a:t>11/23/2017</a:t>
+              <a:t>11/24/2017</a:t>
             </a:fld>
             <a:endParaRPr lang="en-US" dirty="0">
               <a:solidFill>
@@ -7959,7 +7959,7 @@
                 </a:solidFill>
               </a:rPr>
               <a:pPr/>
-              <a:t>11/23/2017</a:t>
+              <a:t>11/24/2017</a:t>
             </a:fld>
             <a:endParaRPr lang="en-US" dirty="0">
               <a:solidFill>
@@ -8169,7 +8169,7 @@
                 </a:solidFill>
               </a:rPr>
               <a:pPr/>
-              <a:t>11/23/2017</a:t>
+              <a:t>11/24/2017</a:t>
             </a:fld>
             <a:endParaRPr lang="en-US" dirty="0">
               <a:solidFill>
@@ -8379,7 +8379,7 @@
                 </a:solidFill>
               </a:rPr>
               <a:pPr/>
-              <a:t>11/23/2017</a:t>
+              <a:t>11/24/2017</a:t>
             </a:fld>
             <a:endParaRPr lang="en-US" dirty="0">
               <a:solidFill>
@@ -8558,7 +8558,7 @@
                 </a:solidFill>
               </a:rPr>
               <a:pPr/>
-              <a:t>11/23/2017</a:t>
+              <a:t>11/24/2017</a:t>
             </a:fld>
             <a:endParaRPr lang="en-US" dirty="0">
               <a:solidFill>
@@ -8799,7 +8799,7 @@
                 </a:solidFill>
               </a:rPr>
               <a:pPr/>
-              <a:t>11/23/2017</a:t>
+              <a:t>11/24/2017</a:t>
             </a:fld>
             <a:endParaRPr lang="en-US" dirty="0">
               <a:solidFill>
@@ -8978,7 +8978,7 @@
                 </a:solidFill>
               </a:rPr>
               <a:pPr/>
-              <a:t>11/23/2017</a:t>
+              <a:t>11/24/2017</a:t>
             </a:fld>
             <a:endParaRPr lang="en-US" dirty="0">
               <a:solidFill>
@@ -9219,7 +9219,7 @@
                 </a:solidFill>
               </a:rPr>
               <a:pPr/>
-              <a:t>11/23/2017</a:t>
+              <a:t>11/24/2017</a:t>
             </a:fld>
             <a:endParaRPr lang="en-US" dirty="0">
               <a:solidFill>
@@ -9429,7 +9429,7 @@
                 </a:solidFill>
               </a:rPr>
               <a:pPr/>
-              <a:t>11/23/2017</a:t>
+              <a:t>11/24/2017</a:t>
             </a:fld>
             <a:endParaRPr lang="en-US" dirty="0">
               <a:solidFill>
@@ -9639,7 +9639,7 @@
                 </a:solidFill>
               </a:rPr>
               <a:pPr/>
-              <a:t>11/23/2017</a:t>
+              <a:t>11/24/2017</a:t>
             </a:fld>
             <a:endParaRPr lang="en-US" dirty="0">
               <a:solidFill>
@@ -9849,7 +9849,7 @@
                 </a:solidFill>
               </a:rPr>
               <a:pPr/>
-              <a:t>11/23/2017</a:t>
+              <a:t>11/24/2017</a:t>
             </a:fld>
             <a:endParaRPr lang="en-US" dirty="0">
               <a:solidFill>
@@ -10059,7 +10059,7 @@
                 </a:solidFill>
               </a:rPr>
               <a:pPr/>
-              <a:t>11/23/2017</a:t>
+              <a:t>11/24/2017</a:t>
             </a:fld>
             <a:endParaRPr lang="en-US" dirty="0">
               <a:solidFill>
@@ -10269,7 +10269,7 @@
                 </a:solidFill>
               </a:rPr>
               <a:pPr/>
-              <a:t>11/23/2017</a:t>
+              <a:t>11/24/2017</a:t>
             </a:fld>
             <a:endParaRPr lang="en-US" dirty="0">
               <a:solidFill>
@@ -10479,7 +10479,7 @@
                 </a:solidFill>
               </a:rPr>
               <a:pPr/>
-              <a:t>11/23/2017</a:t>
+              <a:t>11/24/2017</a:t>
             </a:fld>
             <a:endParaRPr lang="en-US" dirty="0">
               <a:solidFill>
@@ -10689,7 +10689,7 @@
                 </a:solidFill>
               </a:rPr>
               <a:pPr/>
-              <a:t>11/23/2017</a:t>
+              <a:t>11/24/2017</a:t>
             </a:fld>
             <a:endParaRPr lang="en-US" dirty="0">
               <a:solidFill>
@@ -10899,7 +10899,7 @@
                 </a:solidFill>
               </a:rPr>
               <a:pPr/>
-              <a:t>11/23/2017</a:t>
+              <a:t>11/24/2017</a:t>
             </a:fld>
             <a:endParaRPr lang="en-US" dirty="0">
               <a:solidFill>
@@ -11109,7 +11109,7 @@
                 </a:solidFill>
               </a:rPr>
               <a:pPr/>
-              <a:t>11/23/2017</a:t>
+              <a:t>11/24/2017</a:t>
             </a:fld>
             <a:endParaRPr lang="en-US" dirty="0">
               <a:solidFill>
@@ -11319,7 +11319,7 @@
                 </a:solidFill>
               </a:rPr>
               <a:pPr/>
-              <a:t>11/23/2017</a:t>
+              <a:t>11/24/2017</a:t>
             </a:fld>
             <a:endParaRPr lang="en-US" dirty="0">
               <a:solidFill>
@@ -11529,7 +11529,7 @@
                 </a:solidFill>
               </a:rPr>
               <a:pPr/>
-              <a:t>11/23/2017</a:t>
+              <a:t>11/24/2017</a:t>
             </a:fld>
             <a:endParaRPr lang="en-US" dirty="0">
               <a:solidFill>
@@ -31900,8 +31900,13 @@
           <a:p>
             <a:r>
               <a:rPr lang="en-US" dirty="0"/>
-              <a:t>Login with the Admin account.</a:t>
-            </a:r>
+              <a:t>Login with the Admin </a:t>
+            </a:r>
+            <a:r>
+              <a:rPr lang="en-US"/>
+              <a:t>account. </a:t>
+            </a:r>
+            <a:endParaRPr lang="en-US" dirty="0"/>
           </a:p>
         </p:txBody>
       </p:sp>
@@ -34553,6 +34558,15 @@
 </file>
 
 <file path=customXml/item1.xml><?xml version="1.0" encoding="utf-8"?>
+<?mso-contentType ?>
+<FormTemplates xmlns="http://schemas.microsoft.com/sharepoint/v3/contenttype/forms">
+  <Display>DocumentLibraryForm</Display>
+  <Edit>DocumentLibraryForm</Edit>
+  <New>DocumentLibraryForm</New>
+</FormTemplates>
+</file>
+
+<file path=customXml/item2.xml><?xml version="1.0" encoding="utf-8"?>
 <ct:contentTypeSchema xmlns:ct="http://schemas.microsoft.com/office/2006/metadata/contentType" xmlns:ma="http://schemas.microsoft.com/office/2006/metadata/properties/metaAttributes" ct:_="" ma:_="" ma:contentTypeName="Document" ma:contentTypeID="0x01010053433B08FA9EE742BB667ECEF5AA0226" ma:contentTypeVersion="4" ma:contentTypeDescription="Create a new document." ma:contentTypeScope="" ma:versionID="898350153c3cb7409c9d00c11df4aa1a">
   <xsd:schema xmlns:xsd="http://www.w3.org/2001/XMLSchema" xmlns:xs="http://www.w3.org/2001/XMLSchema" xmlns:p="http://schemas.microsoft.com/office/2006/metadata/properties" xmlns:ns2="09eba053-c572-4474-974d-b0bef0e9174f" targetNamespace="http://schemas.microsoft.com/office/2006/metadata/properties" ma:root="true" ma:fieldsID="f69afda497831ad76ed280df00c0bf48" ns2:_="">
     <xsd:import namespace="09eba053-c572-4474-974d-b0bef0e9174f"/>
@@ -34714,15 +34728,6 @@
 </ct:contentTypeSchema>
 </file>
 
-<file path=customXml/item2.xml><?xml version="1.0" encoding="utf-8"?>
-<?mso-contentType ?>
-<FormTemplates xmlns="http://schemas.microsoft.com/sharepoint/v3/contenttype/forms">
-  <Display>DocumentLibraryForm</Display>
-  <Edit>DocumentLibraryForm</Edit>
-  <New>DocumentLibraryForm</New>
-</FormTemplates>
-</file>
-
 <file path=customXml/item3.xml><?xml version="1.0" encoding="utf-8"?>
 <p:properties xmlns:p="http://schemas.microsoft.com/office/2006/metadata/properties" xmlns:xsi="http://www.w3.org/2001/XMLSchema-instance" xmlns:pc="http://schemas.microsoft.com/office/infopath/2007/PartnerControls">
   <documentManagement/>
@@ -34730,6 +34735,14 @@
 </file>
 
 <file path=customXml/itemProps1.xml><?xml version="1.0" encoding="utf-8"?>
+<ds:datastoreItem xmlns:ds="http://schemas.openxmlformats.org/officeDocument/2006/customXml" ds:itemID="{41543473-98BF-41A8-AEE8-AF1C274C4DD8}">
+  <ds:schemaRefs>
+    <ds:schemaRef ds:uri="http://schemas.microsoft.com/sharepoint/v3/contenttype/forms"/>
+  </ds:schemaRefs>
+</ds:datastoreItem>
+</file>
+
+<file path=customXml/itemProps2.xml><?xml version="1.0" encoding="utf-8"?>
 <ds:datastoreItem xmlns:ds="http://schemas.openxmlformats.org/officeDocument/2006/customXml" ds:itemID="{55F7FE33-E5CA-47B4-B8F6-126891A96CF6}">
   <ds:schemaRefs>
     <ds:schemaRef ds:uri="http://schemas.microsoft.com/office/2006/metadata/contentType"/>
@@ -34743,14 +34756,6 @@
     <ds:schemaRef ds:uri="http://purl.org/dc/elements/1.1/"/>
     <ds:schemaRef ds:uri="http://purl.org/dc/terms/"/>
     <ds:schemaRef ds:uri="http://schemas.microsoft.com/internal/obd"/>
-  </ds:schemaRefs>
-</ds:datastoreItem>
-</file>
-
-<file path=customXml/itemProps2.xml><?xml version="1.0" encoding="utf-8"?>
-<ds:datastoreItem xmlns:ds="http://schemas.openxmlformats.org/officeDocument/2006/customXml" ds:itemID="{41543473-98BF-41A8-AEE8-AF1C274C4DD8}">
-  <ds:schemaRefs>
-    <ds:schemaRef ds:uri="http://schemas.microsoft.com/sharepoint/v3/contenttype/forms"/>
   </ds:schemaRefs>
 </ds:datastoreItem>
 </file>

</xml_diff>